<commit_message>
updated slide part 5-9
</commit_message>
<xml_diff>
--- a/docs/Presentation.pptx
+++ b/docs/Presentation.pptx
@@ -5,10 +5,10 @@
     <p:sldMasterId id="2147483648" r:id="rId1"/>
   </p:sldMasterIdLst>
   <p:notesMasterIdLst>
-    <p:notesMasterId r:id="rId45"/>
+    <p:notesMasterId r:id="rId55"/>
   </p:notesMasterIdLst>
   <p:handoutMasterIdLst>
-    <p:handoutMasterId r:id="rId46"/>
+    <p:handoutMasterId r:id="rId56"/>
   </p:handoutMasterIdLst>
   <p:sldIdLst>
     <p:sldId id="259" r:id="rId2"/>
@@ -52,8 +52,18 @@
     <p:sldId id="347" r:id="rId40"/>
     <p:sldId id="350" r:id="rId41"/>
     <p:sldId id="351" r:id="rId42"/>
-    <p:sldId id="289" r:id="rId43"/>
-    <p:sldId id="326" r:id="rId44"/>
+    <p:sldId id="354" r:id="rId43"/>
+    <p:sldId id="355" r:id="rId44"/>
+    <p:sldId id="356" r:id="rId45"/>
+    <p:sldId id="358" r:id="rId46"/>
+    <p:sldId id="357" r:id="rId47"/>
+    <p:sldId id="359" r:id="rId48"/>
+    <p:sldId id="360" r:id="rId49"/>
+    <p:sldId id="361" r:id="rId50"/>
+    <p:sldId id="363" r:id="rId51"/>
+    <p:sldId id="362" r:id="rId52"/>
+    <p:sldId id="289" r:id="rId53"/>
+    <p:sldId id="326" r:id="rId54"/>
   </p:sldIdLst>
   <p:sldSz cx="9144000" cy="6858000" type="screen4x3"/>
   <p:notesSz cx="6858000" cy="9144000"/>
@@ -256,7 +266,7 @@
           <a:p>
             <a:fld id="{291D7B54-10FA-4B58-9BB9-8A810A6BB78D}" type="datetimeFigureOut">
               <a:rPr lang="en-US" smtClean="0"/>
-              <a:t>6/10/2016</a:t>
+              <a:t>6/11/2016</a:t>
             </a:fld>
             <a:endParaRPr lang="en-US"/>
           </a:p>
@@ -421,7 +431,7 @@
           <a:p>
             <a:fld id="{8480E8FD-D04B-45D3-9727-4D028C5089BD}" type="datetimeFigureOut">
               <a:rPr lang="en-US" smtClean="0"/>
-              <a:t>6/10/2016</a:t>
+              <a:t>6/11/2016</a:t>
             </a:fld>
             <a:endParaRPr lang="en-US"/>
           </a:p>
@@ -822,10 +832,6 @@
           <a:bodyPr/>
           <a:lstStyle/>
           <a:p>
-            <a:r>
-              <a:rPr lang="en-US" dirty="0" smtClean="0"/>
-              <a:t>Spark is data processing framework</a:t>
-            </a:r>
             <a:endParaRPr lang="en-US" dirty="0"/>
           </a:p>
         </p:txBody>
@@ -1042,6 +1048,443 @@
     <p:extLst>
       <p:ext uri="{BB962C8B-B14F-4D97-AF65-F5344CB8AC3E}">
         <p14:creationId xmlns:p14="http://schemas.microsoft.com/office/powerpoint/2010/main" val="1879148779"/>
+      </p:ext>
+    </p:extLst>
+  </p:cSld>
+  <p:clrMapOvr>
+    <a:masterClrMapping/>
+  </p:clrMapOvr>
+</p:notes>
+</file>
+
+<file path=ppt/notesSlides/notesSlide13.xml><?xml version="1.0" encoding="utf-8"?>
+<p:notes xmlns:a="http://schemas.openxmlformats.org/drawingml/2006/main" xmlns:r="http://schemas.openxmlformats.org/officeDocument/2006/relationships" xmlns:p="http://schemas.openxmlformats.org/presentationml/2006/main">
+  <p:cSld>
+    <p:spTree>
+      <p:nvGrpSpPr>
+        <p:cNvPr id="1" name=""/>
+        <p:cNvGrpSpPr/>
+        <p:nvPr/>
+      </p:nvGrpSpPr>
+      <p:grpSpPr>
+        <a:xfrm>
+          <a:off x="0" y="0"/>
+          <a:ext cx="0" cy="0"/>
+          <a:chOff x="0" y="0"/>
+          <a:chExt cx="0" cy="0"/>
+        </a:xfrm>
+      </p:grpSpPr>
+      <p:sp>
+        <p:nvSpPr>
+          <p:cNvPr id="2" name="Slide Image Placeholder 1"/>
+          <p:cNvSpPr>
+            <a:spLocks noGrp="1" noRot="1" noChangeAspect="1"/>
+          </p:cNvSpPr>
+          <p:nvPr>
+            <p:ph type="sldImg"/>
+          </p:nvPr>
+        </p:nvSpPr>
+        <p:spPr/>
+      </p:sp>
+      <p:sp>
+        <p:nvSpPr>
+          <p:cNvPr id="3" name="Notes Placeholder 2"/>
+          <p:cNvSpPr>
+            <a:spLocks noGrp="1"/>
+          </p:cNvSpPr>
+          <p:nvPr>
+            <p:ph type="body" idx="1"/>
+          </p:nvPr>
+        </p:nvSpPr>
+        <p:spPr/>
+        <p:txBody>
+          <a:bodyPr/>
+          <a:lstStyle/>
+          <a:p>
+            <a:endParaRPr lang="en-US" dirty="0"/>
+          </a:p>
+        </p:txBody>
+      </p:sp>
+      <p:sp>
+        <p:nvSpPr>
+          <p:cNvPr id="4" name="Slide Number Placeholder 3"/>
+          <p:cNvSpPr>
+            <a:spLocks noGrp="1"/>
+          </p:cNvSpPr>
+          <p:nvPr>
+            <p:ph type="sldNum" sz="quarter" idx="10"/>
+          </p:nvPr>
+        </p:nvSpPr>
+        <p:spPr/>
+        <p:txBody>
+          <a:bodyPr/>
+          <a:lstStyle/>
+          <a:p>
+            <a:fld id="{0AD24312-430C-47F9-90D6-A40331DAF7A2}" type="slidenum">
+              <a:rPr lang="en-US" smtClean="0"/>
+              <a:t>42</a:t>
+            </a:fld>
+            <a:endParaRPr lang="en-US"/>
+          </a:p>
+        </p:txBody>
+      </p:sp>
+    </p:spTree>
+    <p:extLst>
+      <p:ext uri="{BB962C8B-B14F-4D97-AF65-F5344CB8AC3E}">
+        <p14:creationId xmlns:p14="http://schemas.microsoft.com/office/powerpoint/2010/main" val="481991057"/>
+      </p:ext>
+    </p:extLst>
+  </p:cSld>
+  <p:clrMapOvr>
+    <a:masterClrMapping/>
+  </p:clrMapOvr>
+</p:notes>
+</file>
+
+<file path=ppt/notesSlides/notesSlide14.xml><?xml version="1.0" encoding="utf-8"?>
+<p:notes xmlns:a="http://schemas.openxmlformats.org/drawingml/2006/main" xmlns:r="http://schemas.openxmlformats.org/officeDocument/2006/relationships" xmlns:p="http://schemas.openxmlformats.org/presentationml/2006/main">
+  <p:cSld>
+    <p:spTree>
+      <p:nvGrpSpPr>
+        <p:cNvPr id="1" name=""/>
+        <p:cNvGrpSpPr/>
+        <p:nvPr/>
+      </p:nvGrpSpPr>
+      <p:grpSpPr>
+        <a:xfrm>
+          <a:off x="0" y="0"/>
+          <a:ext cx="0" cy="0"/>
+          <a:chOff x="0" y="0"/>
+          <a:chExt cx="0" cy="0"/>
+        </a:xfrm>
+      </p:grpSpPr>
+      <p:sp>
+        <p:nvSpPr>
+          <p:cNvPr id="2" name="Slide Image Placeholder 1"/>
+          <p:cNvSpPr>
+            <a:spLocks noGrp="1" noRot="1" noChangeAspect="1"/>
+          </p:cNvSpPr>
+          <p:nvPr>
+            <p:ph type="sldImg"/>
+          </p:nvPr>
+        </p:nvSpPr>
+        <p:spPr/>
+      </p:sp>
+      <p:sp>
+        <p:nvSpPr>
+          <p:cNvPr id="3" name="Notes Placeholder 2"/>
+          <p:cNvSpPr>
+            <a:spLocks noGrp="1"/>
+          </p:cNvSpPr>
+          <p:nvPr>
+            <p:ph type="body" idx="1"/>
+          </p:nvPr>
+        </p:nvSpPr>
+        <p:spPr/>
+        <p:txBody>
+          <a:bodyPr/>
+          <a:lstStyle/>
+          <a:p>
+            <a:endParaRPr lang="en-US" dirty="0"/>
+          </a:p>
+        </p:txBody>
+      </p:sp>
+      <p:sp>
+        <p:nvSpPr>
+          <p:cNvPr id="4" name="Slide Number Placeholder 3"/>
+          <p:cNvSpPr>
+            <a:spLocks noGrp="1"/>
+          </p:cNvSpPr>
+          <p:nvPr>
+            <p:ph type="sldNum" sz="quarter" idx="10"/>
+          </p:nvPr>
+        </p:nvSpPr>
+        <p:spPr/>
+        <p:txBody>
+          <a:bodyPr/>
+          <a:lstStyle/>
+          <a:p>
+            <a:fld id="{0AD24312-430C-47F9-90D6-A40331DAF7A2}" type="slidenum">
+              <a:rPr lang="en-US" smtClean="0"/>
+              <a:t>43</a:t>
+            </a:fld>
+            <a:endParaRPr lang="en-US"/>
+          </a:p>
+        </p:txBody>
+      </p:sp>
+    </p:spTree>
+    <p:extLst>
+      <p:ext uri="{BB962C8B-B14F-4D97-AF65-F5344CB8AC3E}">
+        <p14:creationId xmlns:p14="http://schemas.microsoft.com/office/powerpoint/2010/main" val="4229637838"/>
+      </p:ext>
+    </p:extLst>
+  </p:cSld>
+  <p:clrMapOvr>
+    <a:masterClrMapping/>
+  </p:clrMapOvr>
+</p:notes>
+</file>
+
+<file path=ppt/notesSlides/notesSlide15.xml><?xml version="1.0" encoding="utf-8"?>
+<p:notes xmlns:a="http://schemas.openxmlformats.org/drawingml/2006/main" xmlns:r="http://schemas.openxmlformats.org/officeDocument/2006/relationships" xmlns:p="http://schemas.openxmlformats.org/presentationml/2006/main">
+  <p:cSld>
+    <p:spTree>
+      <p:nvGrpSpPr>
+        <p:cNvPr id="1" name=""/>
+        <p:cNvGrpSpPr/>
+        <p:nvPr/>
+      </p:nvGrpSpPr>
+      <p:grpSpPr>
+        <a:xfrm>
+          <a:off x="0" y="0"/>
+          <a:ext cx="0" cy="0"/>
+          <a:chOff x="0" y="0"/>
+          <a:chExt cx="0" cy="0"/>
+        </a:xfrm>
+      </p:grpSpPr>
+      <p:sp>
+        <p:nvSpPr>
+          <p:cNvPr id="2" name="Slide Image Placeholder 1"/>
+          <p:cNvSpPr>
+            <a:spLocks noGrp="1" noRot="1" noChangeAspect="1"/>
+          </p:cNvSpPr>
+          <p:nvPr>
+            <p:ph type="sldImg"/>
+          </p:nvPr>
+        </p:nvSpPr>
+        <p:spPr/>
+      </p:sp>
+      <p:sp>
+        <p:nvSpPr>
+          <p:cNvPr id="3" name="Notes Placeholder 2"/>
+          <p:cNvSpPr>
+            <a:spLocks noGrp="1"/>
+          </p:cNvSpPr>
+          <p:nvPr>
+            <p:ph type="body" idx="1"/>
+          </p:nvPr>
+        </p:nvSpPr>
+        <p:spPr/>
+        <p:txBody>
+          <a:bodyPr/>
+          <a:lstStyle/>
+          <a:p>
+            <a:endParaRPr lang="en-US" dirty="0"/>
+          </a:p>
+        </p:txBody>
+      </p:sp>
+      <p:sp>
+        <p:nvSpPr>
+          <p:cNvPr id="4" name="Slide Number Placeholder 3"/>
+          <p:cNvSpPr>
+            <a:spLocks noGrp="1"/>
+          </p:cNvSpPr>
+          <p:nvPr>
+            <p:ph type="sldNum" sz="quarter" idx="10"/>
+          </p:nvPr>
+        </p:nvSpPr>
+        <p:spPr/>
+        <p:txBody>
+          <a:bodyPr/>
+          <a:lstStyle/>
+          <a:p>
+            <a:fld id="{0AD24312-430C-47F9-90D6-A40331DAF7A2}" type="slidenum">
+              <a:rPr lang="en-US" smtClean="0"/>
+              <a:t>44</a:t>
+            </a:fld>
+            <a:endParaRPr lang="en-US"/>
+          </a:p>
+        </p:txBody>
+      </p:sp>
+    </p:spTree>
+    <p:extLst>
+      <p:ext uri="{BB962C8B-B14F-4D97-AF65-F5344CB8AC3E}">
+        <p14:creationId xmlns:p14="http://schemas.microsoft.com/office/powerpoint/2010/main" val="4076741632"/>
+      </p:ext>
+    </p:extLst>
+  </p:cSld>
+  <p:clrMapOvr>
+    <a:masterClrMapping/>
+  </p:clrMapOvr>
+</p:notes>
+</file>
+
+<file path=ppt/notesSlides/notesSlide16.xml><?xml version="1.0" encoding="utf-8"?>
+<p:notes xmlns:a="http://schemas.openxmlformats.org/drawingml/2006/main" xmlns:r="http://schemas.openxmlformats.org/officeDocument/2006/relationships" xmlns:p="http://schemas.openxmlformats.org/presentationml/2006/main">
+  <p:cSld>
+    <p:spTree>
+      <p:nvGrpSpPr>
+        <p:cNvPr id="1" name=""/>
+        <p:cNvGrpSpPr/>
+        <p:nvPr/>
+      </p:nvGrpSpPr>
+      <p:grpSpPr>
+        <a:xfrm>
+          <a:off x="0" y="0"/>
+          <a:ext cx="0" cy="0"/>
+          <a:chOff x="0" y="0"/>
+          <a:chExt cx="0" cy="0"/>
+        </a:xfrm>
+      </p:grpSpPr>
+      <p:sp>
+        <p:nvSpPr>
+          <p:cNvPr id="2" name="Slide Image Placeholder 1"/>
+          <p:cNvSpPr>
+            <a:spLocks noGrp="1" noRot="1" noChangeAspect="1"/>
+          </p:cNvSpPr>
+          <p:nvPr>
+            <p:ph type="sldImg"/>
+          </p:nvPr>
+        </p:nvSpPr>
+        <p:spPr/>
+      </p:sp>
+      <p:sp>
+        <p:nvSpPr>
+          <p:cNvPr id="3" name="Notes Placeholder 2"/>
+          <p:cNvSpPr>
+            <a:spLocks noGrp="1"/>
+          </p:cNvSpPr>
+          <p:nvPr>
+            <p:ph type="body" idx="1"/>
+          </p:nvPr>
+        </p:nvSpPr>
+        <p:spPr/>
+        <p:txBody>
+          <a:bodyPr/>
+          <a:lstStyle/>
+          <a:p>
+            <a:endParaRPr lang="en-US" dirty="0"/>
+          </a:p>
+        </p:txBody>
+      </p:sp>
+      <p:sp>
+        <p:nvSpPr>
+          <p:cNvPr id="4" name="Slide Number Placeholder 3"/>
+          <p:cNvSpPr>
+            <a:spLocks noGrp="1"/>
+          </p:cNvSpPr>
+          <p:nvPr>
+            <p:ph type="sldNum" sz="quarter" idx="10"/>
+          </p:nvPr>
+        </p:nvSpPr>
+        <p:spPr/>
+        <p:txBody>
+          <a:bodyPr/>
+          <a:lstStyle/>
+          <a:p>
+            <a:fld id="{0AD24312-430C-47F9-90D6-A40331DAF7A2}" type="slidenum">
+              <a:rPr lang="en-US" smtClean="0"/>
+              <a:t>45</a:t>
+            </a:fld>
+            <a:endParaRPr lang="en-US"/>
+          </a:p>
+        </p:txBody>
+      </p:sp>
+    </p:spTree>
+    <p:extLst>
+      <p:ext uri="{BB962C8B-B14F-4D97-AF65-F5344CB8AC3E}">
+        <p14:creationId xmlns:p14="http://schemas.microsoft.com/office/powerpoint/2010/main" val="22259152"/>
+      </p:ext>
+    </p:extLst>
+  </p:cSld>
+  <p:clrMapOvr>
+    <a:masterClrMapping/>
+  </p:clrMapOvr>
+</p:notes>
+</file>
+
+<file path=ppt/notesSlides/notesSlide17.xml><?xml version="1.0" encoding="utf-8"?>
+<p:notes xmlns:a="http://schemas.openxmlformats.org/drawingml/2006/main" xmlns:r="http://schemas.openxmlformats.org/officeDocument/2006/relationships" xmlns:p="http://schemas.openxmlformats.org/presentationml/2006/main">
+  <p:cSld>
+    <p:spTree>
+      <p:nvGrpSpPr>
+        <p:cNvPr id="1" name=""/>
+        <p:cNvGrpSpPr/>
+        <p:nvPr/>
+      </p:nvGrpSpPr>
+      <p:grpSpPr>
+        <a:xfrm>
+          <a:off x="0" y="0"/>
+          <a:ext cx="0" cy="0"/>
+          <a:chOff x="0" y="0"/>
+          <a:chExt cx="0" cy="0"/>
+        </a:xfrm>
+      </p:grpSpPr>
+      <p:sp>
+        <p:nvSpPr>
+          <p:cNvPr id="2" name="Slide Image Placeholder 1"/>
+          <p:cNvSpPr>
+            <a:spLocks noGrp="1" noRot="1" noChangeAspect="1"/>
+          </p:cNvSpPr>
+          <p:nvPr>
+            <p:ph type="sldImg"/>
+          </p:nvPr>
+        </p:nvSpPr>
+        <p:spPr/>
+      </p:sp>
+      <p:sp>
+        <p:nvSpPr>
+          <p:cNvPr id="3" name="Notes Placeholder 2"/>
+          <p:cNvSpPr>
+            <a:spLocks noGrp="1"/>
+          </p:cNvSpPr>
+          <p:nvPr>
+            <p:ph type="body" idx="1"/>
+          </p:nvPr>
+        </p:nvSpPr>
+        <p:spPr/>
+        <p:txBody>
+          <a:bodyPr/>
+          <a:lstStyle/>
+          <a:p>
+            <a:pPr marL="0" marR="0" indent="0" algn="l" defTabSz="914400" rtl="0" eaLnBrk="1" fontAlgn="auto" latinLnBrk="0" hangingPunct="1">
+              <a:lnSpc>
+                <a:spcPct val="100000"/>
+              </a:lnSpc>
+              <a:spcBef>
+                <a:spcPts val="0"/>
+              </a:spcBef>
+              <a:spcAft>
+                <a:spcPts val="0"/>
+              </a:spcAft>
+              <a:buClrTx/>
+              <a:buSzTx/>
+              <a:buFontTx/>
+              <a:buNone/>
+              <a:tabLst/>
+              <a:defRPr/>
+            </a:pPr>
+            <a:endParaRPr lang="vi-VN" dirty="0"/>
+          </a:p>
+        </p:txBody>
+      </p:sp>
+      <p:sp>
+        <p:nvSpPr>
+          <p:cNvPr id="4" name="Slide Number Placeholder 3"/>
+          <p:cNvSpPr>
+            <a:spLocks noGrp="1"/>
+          </p:cNvSpPr>
+          <p:nvPr>
+            <p:ph type="sldNum" sz="quarter" idx="10"/>
+          </p:nvPr>
+        </p:nvSpPr>
+        <p:spPr/>
+        <p:txBody>
+          <a:bodyPr/>
+          <a:lstStyle/>
+          <a:p>
+            <a:fld id="{0AD24312-430C-47F9-90D6-A40331DAF7A2}" type="slidenum">
+              <a:rPr lang="en-US" smtClean="0"/>
+              <a:t>46</a:t>
+            </a:fld>
+            <a:endParaRPr lang="en-US"/>
+          </a:p>
+        </p:txBody>
+      </p:sp>
+    </p:spTree>
+    <p:extLst>
+      <p:ext uri="{BB962C8B-B14F-4D97-AF65-F5344CB8AC3E}">
+        <p14:creationId xmlns:p14="http://schemas.microsoft.com/office/powerpoint/2010/main" val="4043038985"/>
       </p:ext>
     </p:extLst>
   </p:cSld>
@@ -10699,11 +11142,7 @@
           <a:p>
             <a:r>
               <a:rPr lang="en-US" dirty="0" smtClean="0"/>
-              <a:t>Word </a:t>
-            </a:r>
-            <a:r>
-              <a:rPr lang="en-US" dirty="0" smtClean="0"/>
-              <a:t>count</a:t>
+              <a:t>Word count</a:t>
             </a:r>
             <a:endParaRPr lang="en-US" dirty="0"/>
           </a:p>
@@ -10772,8 +11211,40 @@
             <a:pPr lvl="1"/>
             <a:r>
               <a:rPr lang="en-US" dirty="0" smtClean="0"/>
-              <a:t>In 2 ways: Hadoop &amp; Spark</a:t>
-            </a:r>
+              <a:t>In 2 ways: Hadoop &amp; </a:t>
+            </a:r>
+            <a:r>
+              <a:rPr lang="en-US" dirty="0" smtClean="0"/>
+              <a:t>Spark</a:t>
+            </a:r>
+          </a:p>
+          <a:p>
+            <a:pPr lvl="1"/>
+            <a:r>
+              <a:rPr lang="en-US" dirty="0" smtClean="0"/>
+              <a:t>\project\spark\</a:t>
+            </a:r>
+            <a:r>
+              <a:rPr lang="en-US" dirty="0" err="1" smtClean="0"/>
+              <a:t>src</a:t>
+            </a:r>
+            <a:r>
+              <a:rPr lang="en-US" dirty="0" smtClean="0"/>
+              <a:t>\main\java\com\spark\</a:t>
+            </a:r>
+            <a:r>
+              <a:rPr lang="en-US" dirty="0" err="1" smtClean="0"/>
+              <a:t>wordcount</a:t>
+            </a:r>
+            <a:r>
+              <a:rPr lang="en-US" dirty="0" smtClean="0"/>
+              <a:t>\WordCount.java</a:t>
+            </a:r>
+            <a:endParaRPr lang="en-US" dirty="0"/>
+          </a:p>
+          <a:p>
+            <a:pPr lvl="1"/>
+            <a:endParaRPr lang="en-US" dirty="0" smtClean="0"/>
           </a:p>
           <a:p>
             <a:endParaRPr lang="en-US" dirty="0"/>
@@ -13112,6 +13583,1748 @@
           <a:chExt cx="0" cy="0"/>
         </a:xfrm>
       </p:grpSpPr>
+      <p:sp>
+        <p:nvSpPr>
+          <p:cNvPr id="2" name="Title 1"/>
+          <p:cNvSpPr>
+            <a:spLocks noGrp="1"/>
+          </p:cNvSpPr>
+          <p:nvPr>
+            <p:ph type="title"/>
+          </p:nvPr>
+        </p:nvSpPr>
+        <p:spPr/>
+        <p:txBody>
+          <a:bodyPr/>
+          <a:lstStyle/>
+          <a:p>
+            <a:r>
+              <a:rPr lang="en-US" dirty="0" err="1" smtClean="0"/>
+              <a:t>HBAse</a:t>
+            </a:r>
+            <a:r>
+              <a:rPr lang="en-US" dirty="0" smtClean="0"/>
+              <a:t> Table</a:t>
+            </a:r>
+            <a:endParaRPr lang="en-US" dirty="0"/>
+          </a:p>
+        </p:txBody>
+      </p:sp>
+      <p:sp>
+        <p:nvSpPr>
+          <p:cNvPr id="3" name="Content Placeholder 2"/>
+          <p:cNvSpPr>
+            <a:spLocks noGrp="1"/>
+          </p:cNvSpPr>
+          <p:nvPr>
+            <p:ph idx="1"/>
+          </p:nvPr>
+        </p:nvSpPr>
+        <p:spPr>
+          <a:xfrm>
+            <a:off x="457199" y="1500317"/>
+            <a:ext cx="8259098" cy="4886835"/>
+          </a:xfrm>
+        </p:spPr>
+        <p:txBody>
+          <a:bodyPr/>
+          <a:lstStyle/>
+          <a:p>
+            <a:r>
+              <a:rPr lang="en-US" dirty="0" smtClean="0"/>
+              <a:t>Purpose </a:t>
+            </a:r>
+          </a:p>
+          <a:p>
+            <a:pPr lvl="1"/>
+            <a:r>
+              <a:rPr lang="en-US" dirty="0" smtClean="0"/>
+              <a:t>Understands </a:t>
+            </a:r>
+            <a:r>
+              <a:rPr lang="en-US" dirty="0" smtClean="0"/>
+              <a:t>more about </a:t>
+            </a:r>
+            <a:r>
+              <a:rPr lang="en-US" dirty="0" err="1" smtClean="0"/>
+              <a:t>HBase</a:t>
+            </a:r>
+            <a:r>
+              <a:rPr lang="en-US" dirty="0" smtClean="0"/>
+              <a:t> </a:t>
+            </a:r>
+          </a:p>
+          <a:p>
+            <a:pPr lvl="1"/>
+            <a:r>
+              <a:rPr lang="en-US" dirty="0" smtClean="0"/>
+              <a:t>Using </a:t>
+            </a:r>
+            <a:r>
+              <a:rPr lang="en-US" dirty="0" err="1" smtClean="0"/>
+              <a:t>HBase</a:t>
+            </a:r>
+            <a:r>
+              <a:rPr lang="en-US" dirty="0" smtClean="0"/>
+              <a:t> Java API </a:t>
+            </a:r>
+            <a:endParaRPr lang="en-US" dirty="0" smtClean="0"/>
+          </a:p>
+          <a:p>
+            <a:r>
+              <a:rPr lang="en-US" dirty="0" smtClean="0"/>
+              <a:t>Feature:</a:t>
+            </a:r>
+            <a:endParaRPr lang="en-US" dirty="0" smtClean="0"/>
+          </a:p>
+          <a:p>
+            <a:pPr lvl="1"/>
+            <a:r>
+              <a:rPr lang="en-US" dirty="0" smtClean="0"/>
+              <a:t>Create table, d</a:t>
+            </a:r>
+            <a:r>
+              <a:rPr lang="en-US" dirty="0" smtClean="0"/>
+              <a:t>elete table</a:t>
+            </a:r>
+          </a:p>
+          <a:p>
+            <a:pPr lvl="1"/>
+            <a:r>
+              <a:rPr lang="en-US" dirty="0" smtClean="0"/>
+              <a:t>Add record, delete record.</a:t>
+            </a:r>
+          </a:p>
+          <a:p>
+            <a:pPr lvl="1"/>
+            <a:r>
+              <a:rPr lang="en-US" dirty="0" smtClean="0"/>
+              <a:t>Get one/all record(s)</a:t>
+            </a:r>
+            <a:endParaRPr lang="en-US" dirty="0"/>
+          </a:p>
+          <a:p>
+            <a:r>
+              <a:rPr lang="en-US" dirty="0" smtClean="0"/>
+              <a:t>Implemented </a:t>
+            </a:r>
+            <a:r>
+              <a:rPr lang="en-US" dirty="0" smtClean="0"/>
+              <a:t>code</a:t>
+            </a:r>
+            <a:endParaRPr lang="en-US" dirty="0" smtClean="0"/>
+          </a:p>
+          <a:p>
+            <a:pPr lvl="1"/>
+            <a:r>
+              <a:rPr lang="en-US" dirty="0" smtClean="0"/>
+              <a:t>Basic </a:t>
+            </a:r>
+            <a:r>
+              <a:rPr lang="en-US" dirty="0" err="1" smtClean="0"/>
+              <a:t>H</a:t>
+            </a:r>
+            <a:r>
+              <a:rPr lang="en-US" dirty="0" err="1"/>
+              <a:t>B</a:t>
+            </a:r>
+            <a:r>
+              <a:rPr lang="en-US" dirty="0" err="1" smtClean="0"/>
+              <a:t>ase</a:t>
+            </a:r>
+            <a:r>
+              <a:rPr lang="en-US" dirty="0" smtClean="0"/>
+              <a:t> example</a:t>
+            </a:r>
+            <a:endParaRPr lang="en-US" dirty="0" smtClean="0"/>
+          </a:p>
+          <a:p>
+            <a:endParaRPr lang="en-US" dirty="0"/>
+          </a:p>
+        </p:txBody>
+      </p:sp>
+    </p:spTree>
+    <p:extLst>
+      <p:ext uri="{BB962C8B-B14F-4D97-AF65-F5344CB8AC3E}">
+        <p14:creationId xmlns:p14="http://schemas.microsoft.com/office/powerpoint/2010/main" val="367674034"/>
+      </p:ext>
+    </p:extLst>
+  </p:cSld>
+  <p:clrMapOvr>
+    <a:masterClrMapping/>
+  </p:clrMapOvr>
+  <p:timing>
+    <p:tnLst>
+      <p:par>
+        <p:cTn id="1" dur="indefinite" restart="never" nodeType="tmRoot"/>
+      </p:par>
+    </p:tnLst>
+  </p:timing>
+</p:sld>
+</file>
+
+<file path=ppt/slides/slide43.xml><?xml version="1.0" encoding="utf-8"?>
+<p:sld xmlns:a="http://schemas.openxmlformats.org/drawingml/2006/main" xmlns:r="http://schemas.openxmlformats.org/officeDocument/2006/relationships" xmlns:p="http://schemas.openxmlformats.org/presentationml/2006/main">
+  <p:cSld>
+    <p:spTree>
+      <p:nvGrpSpPr>
+        <p:cNvPr id="1" name=""/>
+        <p:cNvGrpSpPr/>
+        <p:nvPr/>
+      </p:nvGrpSpPr>
+      <p:grpSpPr>
+        <a:xfrm>
+          <a:off x="0" y="0"/>
+          <a:ext cx="0" cy="0"/>
+          <a:chOff x="0" y="0"/>
+          <a:chExt cx="0" cy="0"/>
+        </a:xfrm>
+      </p:grpSpPr>
+      <p:sp>
+        <p:nvSpPr>
+          <p:cNvPr id="2" name="Title 1"/>
+          <p:cNvSpPr>
+            <a:spLocks noGrp="1"/>
+          </p:cNvSpPr>
+          <p:nvPr>
+            <p:ph type="title"/>
+          </p:nvPr>
+        </p:nvSpPr>
+        <p:spPr/>
+        <p:txBody>
+          <a:bodyPr/>
+          <a:lstStyle/>
+          <a:p>
+            <a:r>
+              <a:rPr lang="en-US" dirty="0" smtClean="0"/>
+              <a:t>Project steps</a:t>
+            </a:r>
+            <a:endParaRPr lang="en-US" dirty="0"/>
+          </a:p>
+        </p:txBody>
+      </p:sp>
+      <p:sp>
+        <p:nvSpPr>
+          <p:cNvPr id="3" name="Content Placeholder 2"/>
+          <p:cNvSpPr>
+            <a:spLocks noGrp="1"/>
+          </p:cNvSpPr>
+          <p:nvPr>
+            <p:ph idx="1"/>
+          </p:nvPr>
+        </p:nvSpPr>
+        <p:spPr>
+          <a:xfrm>
+            <a:off x="457199" y="1315005"/>
+            <a:ext cx="8259098" cy="4525963"/>
+          </a:xfrm>
+        </p:spPr>
+        <p:txBody>
+          <a:bodyPr/>
+          <a:lstStyle/>
+          <a:p>
+            <a:r>
+              <a:rPr lang="en-US" dirty="0" err="1"/>
+              <a:t>Creat</a:t>
+            </a:r>
+            <a:r>
+              <a:rPr lang="en-US" dirty="0"/>
+              <a:t> an </a:t>
+            </a:r>
+            <a:r>
+              <a:rPr lang="en-US" dirty="0" err="1"/>
+              <a:t>HBase</a:t>
+            </a:r>
+            <a:r>
+              <a:rPr lang="en-US" dirty="0"/>
+              <a:t> Maven Project</a:t>
+            </a:r>
+          </a:p>
+          <a:p>
+            <a:r>
+              <a:rPr lang="en-US" dirty="0" smtClean="0"/>
+              <a:t>Edit file pom.xml </a:t>
+            </a:r>
+            <a:r>
+              <a:rPr lang="en-US" dirty="0" err="1" smtClean="0"/>
+              <a:t>config</a:t>
+            </a:r>
+            <a:r>
+              <a:rPr lang="en-US" dirty="0" smtClean="0"/>
+              <a:t>.</a:t>
+            </a:r>
+          </a:p>
+          <a:p>
+            <a:endParaRPr lang="en-US" dirty="0" smtClean="0"/>
+          </a:p>
+          <a:p>
+            <a:endParaRPr lang="en-US" dirty="0"/>
+          </a:p>
+          <a:p>
+            <a:endParaRPr lang="en-US" dirty="0" smtClean="0"/>
+          </a:p>
+          <a:p>
+            <a:r>
+              <a:rPr lang="en-US" dirty="0" smtClean="0"/>
+              <a:t>Implemented code</a:t>
+            </a:r>
+            <a:endParaRPr lang="en-US" dirty="0" smtClean="0"/>
+          </a:p>
+          <a:p>
+            <a:pPr lvl="1"/>
+            <a:r>
+              <a:rPr lang="en-US" dirty="0" smtClean="0"/>
+              <a:t>Basic </a:t>
+            </a:r>
+            <a:r>
+              <a:rPr lang="en-US" dirty="0" err="1" smtClean="0"/>
+              <a:t>HB</a:t>
+            </a:r>
+            <a:r>
+              <a:rPr lang="en-US" dirty="0" err="1" smtClean="0"/>
+              <a:t>ase</a:t>
+            </a:r>
+            <a:r>
+              <a:rPr lang="en-US" dirty="0" smtClean="0"/>
+              <a:t> example</a:t>
+            </a:r>
+          </a:p>
+          <a:p>
+            <a:pPr lvl="1"/>
+            <a:r>
+              <a:rPr lang="en-US" dirty="0"/>
+              <a:t>\</a:t>
+            </a:r>
+            <a:r>
+              <a:rPr lang="en-US" dirty="0" smtClean="0"/>
+              <a:t>project\</a:t>
+            </a:r>
+            <a:r>
+              <a:rPr lang="en-US" dirty="0" err="1" smtClean="0"/>
+              <a:t>hbase</a:t>
+            </a:r>
+            <a:r>
+              <a:rPr lang="en-US" dirty="0" smtClean="0"/>
+              <a:t>\</a:t>
+            </a:r>
+            <a:r>
+              <a:rPr lang="en-US" dirty="0" err="1" smtClean="0"/>
+              <a:t>src</a:t>
+            </a:r>
+            <a:r>
+              <a:rPr lang="en-US" dirty="0" smtClean="0"/>
+              <a:t>\main\java\com\</a:t>
+            </a:r>
+            <a:r>
+              <a:rPr lang="en-US" dirty="0" err="1" smtClean="0"/>
+              <a:t>hbase</a:t>
+            </a:r>
+            <a:r>
+              <a:rPr lang="en-US" dirty="0" smtClean="0"/>
+              <a:t>\table\HBaseTable.java</a:t>
+            </a:r>
+            <a:endParaRPr lang="en-US" dirty="0"/>
+          </a:p>
+          <a:p>
+            <a:pPr marL="457188" lvl="1" indent="0">
+              <a:buNone/>
+            </a:pPr>
+            <a:endParaRPr lang="en-US" dirty="0" smtClean="0"/>
+          </a:p>
+          <a:p>
+            <a:endParaRPr lang="en-US" dirty="0"/>
+          </a:p>
+        </p:txBody>
+      </p:sp>
+      <p:pic>
+        <p:nvPicPr>
+          <p:cNvPr id="4" name="Picture 3"/>
+          <p:cNvPicPr>
+            <a:picLocks noChangeAspect="1"/>
+          </p:cNvPicPr>
+          <p:nvPr/>
+        </p:nvPicPr>
+        <p:blipFill>
+          <a:blip r:embed="rId3"/>
+          <a:stretch>
+            <a:fillRect/>
+          </a:stretch>
+        </p:blipFill>
+        <p:spPr>
+          <a:xfrm>
+            <a:off x="1518358" y="2570327"/>
+            <a:ext cx="6136780" cy="1578593"/>
+          </a:xfrm>
+          <a:prstGeom prst="rect">
+            <a:avLst/>
+          </a:prstGeom>
+        </p:spPr>
+      </p:pic>
+    </p:spTree>
+    <p:extLst>
+      <p:ext uri="{BB962C8B-B14F-4D97-AF65-F5344CB8AC3E}">
+        <p14:creationId xmlns:p14="http://schemas.microsoft.com/office/powerpoint/2010/main" val="1422347040"/>
+      </p:ext>
+    </p:extLst>
+  </p:cSld>
+  <p:clrMapOvr>
+    <a:masterClrMapping/>
+  </p:clrMapOvr>
+  <p:timing>
+    <p:tnLst>
+      <p:par>
+        <p:cTn id="1" dur="indefinite" restart="never" nodeType="tmRoot"/>
+      </p:par>
+    </p:tnLst>
+  </p:timing>
+</p:sld>
+</file>
+
+<file path=ppt/slides/slide44.xml><?xml version="1.0" encoding="utf-8"?>
+<p:sld xmlns:a="http://schemas.openxmlformats.org/drawingml/2006/main" xmlns:r="http://schemas.openxmlformats.org/officeDocument/2006/relationships" xmlns:p="http://schemas.openxmlformats.org/presentationml/2006/main">
+  <p:cSld>
+    <p:spTree>
+      <p:nvGrpSpPr>
+        <p:cNvPr id="1" name=""/>
+        <p:cNvGrpSpPr/>
+        <p:nvPr/>
+      </p:nvGrpSpPr>
+      <p:grpSpPr>
+        <a:xfrm>
+          <a:off x="0" y="0"/>
+          <a:ext cx="0" cy="0"/>
+          <a:chOff x="0" y="0"/>
+          <a:chExt cx="0" cy="0"/>
+        </a:xfrm>
+      </p:grpSpPr>
+      <p:sp>
+        <p:nvSpPr>
+          <p:cNvPr id="2" name="Title 1"/>
+          <p:cNvSpPr>
+            <a:spLocks noGrp="1"/>
+          </p:cNvSpPr>
+          <p:nvPr>
+            <p:ph type="title"/>
+          </p:nvPr>
+        </p:nvSpPr>
+        <p:spPr/>
+        <p:txBody>
+          <a:bodyPr/>
+          <a:lstStyle/>
+          <a:p>
+            <a:r>
+              <a:rPr lang="en-US" dirty="0" smtClean="0"/>
+              <a:t>OUTPUT</a:t>
+            </a:r>
+            <a:endParaRPr lang="en-US" dirty="0"/>
+          </a:p>
+        </p:txBody>
+      </p:sp>
+      <p:pic>
+        <p:nvPicPr>
+          <p:cNvPr id="6" name="Picture 5"/>
+          <p:cNvPicPr>
+            <a:picLocks noChangeAspect="1"/>
+          </p:cNvPicPr>
+          <p:nvPr/>
+        </p:nvPicPr>
+        <p:blipFill rotWithShape="1">
+          <a:blip r:embed="rId3"/>
+          <a:srcRect r="16785"/>
+          <a:stretch/>
+        </p:blipFill>
+        <p:spPr>
+          <a:xfrm>
+            <a:off x="671938" y="914399"/>
+            <a:ext cx="4023117" cy="3930555"/>
+          </a:xfrm>
+          <a:prstGeom prst="rect">
+            <a:avLst/>
+          </a:prstGeom>
+        </p:spPr>
+      </p:pic>
+      <p:pic>
+        <p:nvPicPr>
+          <p:cNvPr id="7" name="Picture 6"/>
+          <p:cNvPicPr>
+            <a:picLocks noChangeAspect="1"/>
+          </p:cNvPicPr>
+          <p:nvPr/>
+        </p:nvPicPr>
+        <p:blipFill>
+          <a:blip r:embed="rId4"/>
+          <a:stretch>
+            <a:fillRect/>
+          </a:stretch>
+        </p:blipFill>
+        <p:spPr>
+          <a:xfrm>
+            <a:off x="4909792" y="3774852"/>
+            <a:ext cx="3916908" cy="2358568"/>
+          </a:xfrm>
+          <a:prstGeom prst="rect">
+            <a:avLst/>
+          </a:prstGeom>
+        </p:spPr>
+      </p:pic>
+    </p:spTree>
+    <p:extLst>
+      <p:ext uri="{BB962C8B-B14F-4D97-AF65-F5344CB8AC3E}">
+        <p14:creationId xmlns:p14="http://schemas.microsoft.com/office/powerpoint/2010/main" val="2808027754"/>
+      </p:ext>
+    </p:extLst>
+  </p:cSld>
+  <p:clrMapOvr>
+    <a:masterClrMapping/>
+  </p:clrMapOvr>
+  <p:timing>
+    <p:tnLst>
+      <p:par>
+        <p:cTn id="1" dur="indefinite" restart="never" nodeType="tmRoot"/>
+      </p:par>
+    </p:tnLst>
+  </p:timing>
+</p:sld>
+</file>
+
+<file path=ppt/slides/slide45.xml><?xml version="1.0" encoding="utf-8"?>
+<p:sld xmlns:a="http://schemas.openxmlformats.org/drawingml/2006/main" xmlns:r="http://schemas.openxmlformats.org/officeDocument/2006/relationships" xmlns:p="http://schemas.openxmlformats.org/presentationml/2006/main">
+  <p:cSld>
+    <p:spTree>
+      <p:nvGrpSpPr>
+        <p:cNvPr id="1" name=""/>
+        <p:cNvGrpSpPr/>
+        <p:nvPr/>
+      </p:nvGrpSpPr>
+      <p:grpSpPr>
+        <a:xfrm>
+          <a:off x="0" y="0"/>
+          <a:ext cx="0" cy="0"/>
+          <a:chOff x="0" y="0"/>
+          <a:chExt cx="0" cy="0"/>
+        </a:xfrm>
+      </p:grpSpPr>
+      <p:sp>
+        <p:nvSpPr>
+          <p:cNvPr id="2" name="Title 1"/>
+          <p:cNvSpPr>
+            <a:spLocks noGrp="1"/>
+          </p:cNvSpPr>
+          <p:nvPr>
+            <p:ph type="title"/>
+          </p:nvPr>
+        </p:nvSpPr>
+        <p:spPr/>
+        <p:txBody>
+          <a:bodyPr/>
+          <a:lstStyle/>
+          <a:p>
+            <a:r>
+              <a:rPr lang="en-US" dirty="0" smtClean="0"/>
+              <a:t>Using UI to Manage</a:t>
+            </a:r>
+            <a:endParaRPr lang="en-US" dirty="0"/>
+          </a:p>
+        </p:txBody>
+      </p:sp>
+      <p:pic>
+        <p:nvPicPr>
+          <p:cNvPr id="3" name="Picture 2"/>
+          <p:cNvPicPr>
+            <a:picLocks noChangeAspect="1"/>
+          </p:cNvPicPr>
+          <p:nvPr/>
+        </p:nvPicPr>
+        <p:blipFill>
+          <a:blip r:embed="rId3"/>
+          <a:stretch>
+            <a:fillRect/>
+          </a:stretch>
+        </p:blipFill>
+        <p:spPr>
+          <a:xfrm>
+            <a:off x="341194" y="1624084"/>
+            <a:ext cx="8502555" cy="4473905"/>
+          </a:xfrm>
+          <a:prstGeom prst="rect">
+            <a:avLst/>
+          </a:prstGeom>
+        </p:spPr>
+      </p:pic>
+      <p:sp>
+        <p:nvSpPr>
+          <p:cNvPr id="8" name="Content Placeholder 2"/>
+          <p:cNvSpPr>
+            <a:spLocks noGrp="1"/>
+          </p:cNvSpPr>
+          <p:nvPr>
+            <p:ph idx="1"/>
+          </p:nvPr>
+        </p:nvSpPr>
+        <p:spPr>
+          <a:xfrm>
+            <a:off x="341194" y="919049"/>
+            <a:ext cx="8544600" cy="973640"/>
+          </a:xfrm>
+        </p:spPr>
+        <p:txBody>
+          <a:bodyPr/>
+          <a:lstStyle/>
+          <a:p>
+            <a:r>
+              <a:rPr lang="en-US" dirty="0" smtClean="0"/>
+              <a:t>Default username/password: </a:t>
+            </a:r>
+            <a:r>
+              <a:rPr lang="en-US" dirty="0" err="1" smtClean="0"/>
+              <a:t>cloudera</a:t>
+            </a:r>
+            <a:r>
+              <a:rPr lang="en-US" dirty="0"/>
+              <a:t>/ </a:t>
+            </a:r>
+            <a:r>
+              <a:rPr lang="en-US" dirty="0" err="1"/>
+              <a:t>cloudera</a:t>
+            </a:r>
+            <a:endParaRPr lang="en-US" dirty="0" smtClean="0"/>
+          </a:p>
+          <a:p>
+            <a:endParaRPr lang="en-US" dirty="0"/>
+          </a:p>
+        </p:txBody>
+      </p:sp>
+    </p:spTree>
+    <p:extLst>
+      <p:ext uri="{BB962C8B-B14F-4D97-AF65-F5344CB8AC3E}">
+        <p14:creationId xmlns:p14="http://schemas.microsoft.com/office/powerpoint/2010/main" val="536958049"/>
+      </p:ext>
+    </p:extLst>
+  </p:cSld>
+  <p:clrMapOvr>
+    <a:masterClrMapping/>
+  </p:clrMapOvr>
+  <p:timing>
+    <p:tnLst>
+      <p:par>
+        <p:cTn id="1" dur="indefinite" restart="never" nodeType="tmRoot"/>
+      </p:par>
+    </p:tnLst>
+  </p:timing>
+</p:sld>
+</file>
+
+<file path=ppt/slides/slide46.xml><?xml version="1.0" encoding="utf-8"?>
+<p:sld xmlns:a="http://schemas.openxmlformats.org/drawingml/2006/main" xmlns:r="http://schemas.openxmlformats.org/officeDocument/2006/relationships" xmlns:p="http://schemas.openxmlformats.org/presentationml/2006/main">
+  <p:cSld>
+    <p:spTree>
+      <p:nvGrpSpPr>
+        <p:cNvPr id="1" name=""/>
+        <p:cNvGrpSpPr/>
+        <p:nvPr/>
+      </p:nvGrpSpPr>
+      <p:grpSpPr>
+        <a:xfrm>
+          <a:off x="0" y="0"/>
+          <a:ext cx="0" cy="0"/>
+          <a:chOff x="0" y="0"/>
+          <a:chExt cx="0" cy="0"/>
+        </a:xfrm>
+      </p:grpSpPr>
+      <p:sp>
+        <p:nvSpPr>
+          <p:cNvPr id="2" name="Title 1"/>
+          <p:cNvSpPr>
+            <a:spLocks noGrp="1"/>
+          </p:cNvSpPr>
+          <p:nvPr>
+            <p:ph type="ctrTitle"/>
+          </p:nvPr>
+        </p:nvSpPr>
+        <p:spPr>
+          <a:xfrm>
+            <a:off x="2197701" y="2301665"/>
+            <a:ext cx="5574700" cy="1369583"/>
+          </a:xfrm>
+        </p:spPr>
+        <p:txBody>
+          <a:bodyPr/>
+          <a:lstStyle/>
+          <a:p>
+            <a:r>
+              <a:rPr lang="en-US" dirty="0" smtClean="0"/>
+              <a:t>Part </a:t>
+            </a:r>
+            <a:r>
+              <a:rPr lang="en-US" dirty="0" smtClean="0"/>
+              <a:t>9</a:t>
+            </a:r>
+            <a:r>
+              <a:rPr lang="en-US" dirty="0" smtClean="0"/>
+              <a:t/>
+            </a:r>
+            <a:br>
+              <a:rPr lang="en-US" dirty="0" smtClean="0"/>
+            </a:br>
+            <a:r>
+              <a:rPr lang="en-US" dirty="0"/>
+              <a:t>Optional Project</a:t>
+            </a:r>
+            <a:endParaRPr lang="en-US" dirty="0"/>
+          </a:p>
+        </p:txBody>
+      </p:sp>
+      <p:sp>
+        <p:nvSpPr>
+          <p:cNvPr id="4" name="TextBox 3"/>
+          <p:cNvSpPr txBox="1"/>
+          <p:nvPr/>
+        </p:nvSpPr>
+        <p:spPr>
+          <a:xfrm>
+            <a:off x="713983" y="5796870"/>
+            <a:ext cx="5824603" cy="1691014"/>
+          </a:xfrm>
+          <a:prstGeom prst="rect">
+            <a:avLst/>
+          </a:prstGeom>
+        </p:spPr>
+        <p:txBody>
+          <a:bodyPr vert="horz" wrap="square" lIns="91440" tIns="45720" rIns="91440" bIns="45720" rtlCol="0" anchor="t">
+            <a:normAutofit/>
+          </a:bodyPr>
+          <a:lstStyle/>
+          <a:p>
+            <a:endParaRPr lang="en-US" b="0" i="0" dirty="0" smtClean="0">
+              <a:latin typeface="Gill Sans Light"/>
+              <a:cs typeface="Gill Sans Light"/>
+            </a:endParaRPr>
+          </a:p>
+        </p:txBody>
+      </p:sp>
+    </p:spTree>
+    <p:extLst>
+      <p:ext uri="{BB962C8B-B14F-4D97-AF65-F5344CB8AC3E}">
+        <p14:creationId xmlns:p14="http://schemas.microsoft.com/office/powerpoint/2010/main" val="552526671"/>
+      </p:ext>
+    </p:extLst>
+  </p:cSld>
+  <p:clrMapOvr>
+    <a:masterClrMapping/>
+  </p:clrMapOvr>
+  <p:timing>
+    <p:tnLst>
+      <p:par>
+        <p:cTn id="1" dur="indefinite" restart="never" nodeType="tmRoot"/>
+      </p:par>
+    </p:tnLst>
+  </p:timing>
+</p:sld>
+</file>
+
+<file path=ppt/slides/slide47.xml><?xml version="1.0" encoding="utf-8"?>
+<p:sld xmlns:a="http://schemas.openxmlformats.org/drawingml/2006/main" xmlns:r="http://schemas.openxmlformats.org/officeDocument/2006/relationships" xmlns:p="http://schemas.openxmlformats.org/presentationml/2006/main">
+  <p:cSld>
+    <p:spTree>
+      <p:nvGrpSpPr>
+        <p:cNvPr id="1" name=""/>
+        <p:cNvGrpSpPr/>
+        <p:nvPr/>
+      </p:nvGrpSpPr>
+      <p:grpSpPr>
+        <a:xfrm>
+          <a:off x="0" y="0"/>
+          <a:ext cx="0" cy="0"/>
+          <a:chOff x="0" y="0"/>
+          <a:chExt cx="0" cy="0"/>
+        </a:xfrm>
+      </p:grpSpPr>
+      <p:sp>
+        <p:nvSpPr>
+          <p:cNvPr id="2" name="Title 1"/>
+          <p:cNvSpPr>
+            <a:spLocks noGrp="1"/>
+          </p:cNvSpPr>
+          <p:nvPr>
+            <p:ph type="title"/>
+          </p:nvPr>
+        </p:nvSpPr>
+        <p:spPr/>
+        <p:txBody>
+          <a:bodyPr/>
+          <a:lstStyle/>
+          <a:p>
+            <a:r>
+              <a:rPr lang="en-US" dirty="0" smtClean="0"/>
+              <a:t>Pseudo code</a:t>
+            </a:r>
+            <a:endParaRPr lang="en-US" dirty="0"/>
+          </a:p>
+        </p:txBody>
+      </p:sp>
+      <p:sp>
+        <p:nvSpPr>
+          <p:cNvPr id="6" name="Rectangle 5"/>
+          <p:cNvSpPr/>
+          <p:nvPr/>
+        </p:nvSpPr>
+        <p:spPr>
+          <a:xfrm>
+            <a:off x="694937" y="1064750"/>
+            <a:ext cx="7374195" cy="4822723"/>
+          </a:xfrm>
+          <a:prstGeom prst="rect">
+            <a:avLst/>
+          </a:prstGeom>
+        </p:spPr>
+        <p:style>
+          <a:lnRef idx="1">
+            <a:schemeClr val="accent1"/>
+          </a:lnRef>
+          <a:fillRef idx="3">
+            <a:schemeClr val="accent1"/>
+          </a:fillRef>
+          <a:effectRef idx="2">
+            <a:schemeClr val="accent1"/>
+          </a:effectRef>
+          <a:fontRef idx="minor">
+            <a:schemeClr val="lt1"/>
+          </a:fontRef>
+        </p:style>
+        <p:txBody>
+          <a:bodyPr rtlCol="0" anchor="ctr"/>
+          <a:lstStyle/>
+          <a:p>
+            <a:r>
+              <a:rPr lang="en-US" sz="1600" dirty="0"/>
+              <a:t>	class Mapper</a:t>
+            </a:r>
+          </a:p>
+          <a:p>
+            <a:r>
+              <a:rPr lang="en-US" sz="1600" dirty="0"/>
+              <a:t>		method Map(</a:t>
+            </a:r>
+            <a:r>
+              <a:rPr lang="en-US" sz="1600" dirty="0" err="1"/>
+              <a:t>docid</a:t>
+            </a:r>
+            <a:r>
+              <a:rPr lang="en-US" sz="1600" dirty="0"/>
+              <a:t> a, doc d)</a:t>
+            </a:r>
+          </a:p>
+          <a:p>
+            <a:r>
+              <a:rPr lang="en-US" sz="1600" dirty="0"/>
+              <a:t>			for all </a:t>
+            </a:r>
+            <a:r>
+              <a:rPr lang="en-US" sz="1600" dirty="0" smtClean="0"/>
+              <a:t>row </a:t>
+            </a:r>
+            <a:r>
+              <a:rPr lang="en-US" sz="1600" dirty="0"/>
+              <a:t>in doc d </a:t>
+            </a:r>
+            <a:r>
+              <a:rPr lang="en-US" sz="1600" dirty="0" smtClean="0"/>
+              <a:t>do</a:t>
+            </a:r>
+          </a:p>
+          <a:p>
+            <a:r>
+              <a:rPr lang="en-US" sz="1600" dirty="0"/>
+              <a:t>	</a:t>
+            </a:r>
+            <a:r>
+              <a:rPr lang="en-US" sz="1600" dirty="0" smtClean="0"/>
+              <a:t>			array = SPLIT(row)</a:t>
+            </a:r>
+            <a:endParaRPr lang="en-US" sz="1600" dirty="0" smtClean="0"/>
+          </a:p>
+          <a:p>
+            <a:r>
+              <a:rPr lang="en-US" sz="1600" dirty="0"/>
+              <a:t>	</a:t>
+            </a:r>
+            <a:r>
+              <a:rPr lang="en-US" sz="1600" dirty="0" smtClean="0"/>
+              <a:t>			</a:t>
+            </a:r>
+            <a:r>
+              <a:rPr lang="en-US" sz="1600" dirty="0" err="1" smtClean="0"/>
+              <a:t>firstName</a:t>
+            </a:r>
+            <a:r>
+              <a:rPr lang="en-US" sz="1600" dirty="0" smtClean="0"/>
+              <a:t> = array[0]</a:t>
+            </a:r>
+            <a:endParaRPr lang="en-US" sz="1600" dirty="0"/>
+          </a:p>
+          <a:p>
+            <a:r>
+              <a:rPr lang="en-US" sz="1600" dirty="0"/>
+              <a:t>				H = new </a:t>
+            </a:r>
+            <a:r>
+              <a:rPr lang="en-US" sz="1600" dirty="0" err="1"/>
+              <a:t>AssociativeArray</a:t>
+            </a:r>
+            <a:endParaRPr lang="en-US" sz="1600" dirty="0"/>
+          </a:p>
+          <a:p>
+            <a:r>
+              <a:rPr lang="en-US" sz="1600" dirty="0"/>
+              <a:t>				for all term u </a:t>
+            </a:r>
+            <a:r>
+              <a:rPr lang="en-US" sz="1600" dirty="0"/>
+              <a:t>in </a:t>
+            </a:r>
+            <a:r>
+              <a:rPr lang="en-US" sz="1600" dirty="0" smtClean="0"/>
+              <a:t>array[1]  </a:t>
+            </a:r>
+            <a:r>
+              <a:rPr lang="en-US" sz="1600" dirty="0"/>
+              <a:t>do</a:t>
+            </a:r>
+          </a:p>
+          <a:p>
+            <a:r>
+              <a:rPr lang="en-US" sz="1600" dirty="0"/>
+              <a:t>					H{u} </a:t>
+            </a:r>
+            <a:r>
+              <a:rPr lang="en-US" sz="1600" dirty="0" smtClean="0"/>
+              <a:t>&lt;-- 1 // Check exist</a:t>
+            </a:r>
+            <a:endParaRPr lang="en-US" sz="1600" dirty="0"/>
+          </a:p>
+          <a:p>
+            <a:r>
+              <a:rPr lang="en-US" sz="1600" dirty="0"/>
+              <a:t>				Emit(term w, stripe H)</a:t>
+            </a:r>
+          </a:p>
+          <a:p>
+            <a:r>
+              <a:rPr lang="en-US" sz="1600" dirty="0"/>
+              <a:t>	class Reducer</a:t>
+            </a:r>
+          </a:p>
+          <a:p>
+            <a:r>
+              <a:rPr lang="en-US" sz="1600" dirty="0"/>
+              <a:t>		method Reduce(term w, stripes [H1, H2,...])</a:t>
+            </a:r>
+          </a:p>
+          <a:p>
+            <a:r>
+              <a:rPr lang="en-US" sz="1600" dirty="0"/>
+              <a:t>			</a:t>
+            </a:r>
+            <a:r>
+              <a:rPr lang="en-US" sz="1600" dirty="0" err="1"/>
+              <a:t>Hf</a:t>
+            </a:r>
+            <a:r>
+              <a:rPr lang="en-US" sz="1600" dirty="0"/>
+              <a:t> = new </a:t>
+            </a:r>
+            <a:r>
+              <a:rPr lang="en-US" sz="1600" dirty="0" err="1"/>
+              <a:t>AssociativeArray</a:t>
+            </a:r>
+            <a:endParaRPr lang="en-US" sz="1600" dirty="0"/>
+          </a:p>
+          <a:p>
+            <a:r>
+              <a:rPr lang="en-US" sz="1600" dirty="0"/>
+              <a:t>			 marginal = 0 </a:t>
+            </a:r>
+          </a:p>
+          <a:p>
+            <a:r>
+              <a:rPr lang="en-US" sz="1600" dirty="0"/>
+              <a:t>			for all stripe H in stripes [H1, H2, ...] do</a:t>
+            </a:r>
+          </a:p>
+          <a:p>
+            <a:r>
+              <a:rPr lang="en-US" sz="1600" dirty="0"/>
+              <a:t>				</a:t>
+            </a:r>
+            <a:r>
+              <a:rPr lang="en-US" sz="1600" dirty="0" err="1" smtClean="0"/>
+              <a:t>Hf</a:t>
+            </a:r>
+            <a:r>
+              <a:rPr lang="en-US" sz="1600" dirty="0" smtClean="0"/>
+              <a:t> = INTERSECT(H, </a:t>
+            </a:r>
+            <a:r>
+              <a:rPr lang="en-US" sz="1600" dirty="0" err="1" smtClean="0"/>
+              <a:t>Hf</a:t>
+            </a:r>
+            <a:r>
+              <a:rPr lang="en-US" sz="1600" dirty="0" smtClean="0"/>
+              <a:t>)</a:t>
+            </a:r>
+            <a:endParaRPr lang="en-US" sz="1600" dirty="0"/>
+          </a:p>
+          <a:p>
+            <a:r>
+              <a:rPr lang="en-US" sz="1600" dirty="0"/>
+              <a:t>			Emit(term w, stripe </a:t>
+            </a:r>
+            <a:r>
+              <a:rPr lang="en-US" sz="1600" dirty="0" err="1"/>
+              <a:t>Hf</a:t>
+            </a:r>
+            <a:r>
+              <a:rPr lang="en-US" sz="1600" dirty="0"/>
+              <a:t>)</a:t>
+            </a:r>
+          </a:p>
+        </p:txBody>
+      </p:sp>
+    </p:spTree>
+    <p:extLst>
+      <p:ext uri="{BB962C8B-B14F-4D97-AF65-F5344CB8AC3E}">
+        <p14:creationId xmlns:p14="http://schemas.microsoft.com/office/powerpoint/2010/main" val="744712813"/>
+      </p:ext>
+    </p:extLst>
+  </p:cSld>
+  <p:clrMapOvr>
+    <a:masterClrMapping/>
+  </p:clrMapOvr>
+  <p:timing>
+    <p:tnLst>
+      <p:par>
+        <p:cTn id="1" dur="indefinite" restart="never" nodeType="tmRoot"/>
+      </p:par>
+    </p:tnLst>
+  </p:timing>
+</p:sld>
+</file>
+
+<file path=ppt/slides/slide48.xml><?xml version="1.0" encoding="utf-8"?>
+<p:sld xmlns:a="http://schemas.openxmlformats.org/drawingml/2006/main" xmlns:r="http://schemas.openxmlformats.org/officeDocument/2006/relationships" xmlns:p="http://schemas.openxmlformats.org/presentationml/2006/main">
+  <p:cSld>
+    <p:spTree>
+      <p:nvGrpSpPr>
+        <p:cNvPr id="1" name=""/>
+        <p:cNvGrpSpPr/>
+        <p:nvPr/>
+      </p:nvGrpSpPr>
+      <p:grpSpPr>
+        <a:xfrm>
+          <a:off x="0" y="0"/>
+          <a:ext cx="0" cy="0"/>
+          <a:chOff x="0" y="0"/>
+          <a:chExt cx="0" cy="0"/>
+        </a:xfrm>
+      </p:grpSpPr>
+      <p:sp>
+        <p:nvSpPr>
+          <p:cNvPr id="2" name="Title 1"/>
+          <p:cNvSpPr>
+            <a:spLocks noGrp="1"/>
+          </p:cNvSpPr>
+          <p:nvPr>
+            <p:ph type="title"/>
+          </p:nvPr>
+        </p:nvSpPr>
+        <p:spPr/>
+        <p:txBody>
+          <a:bodyPr/>
+          <a:lstStyle/>
+          <a:p>
+            <a:r>
+              <a:rPr lang="en-US" dirty="0" smtClean="0"/>
+              <a:t>Implement code</a:t>
+            </a:r>
+            <a:endParaRPr lang="en-US" dirty="0"/>
+          </a:p>
+        </p:txBody>
+      </p:sp>
+      <p:sp>
+        <p:nvSpPr>
+          <p:cNvPr id="3" name="Content Placeholder 2"/>
+          <p:cNvSpPr>
+            <a:spLocks noGrp="1"/>
+          </p:cNvSpPr>
+          <p:nvPr>
+            <p:ph idx="1"/>
+          </p:nvPr>
+        </p:nvSpPr>
+        <p:spPr>
+          <a:xfrm>
+            <a:off x="457206" y="1500325"/>
+            <a:ext cx="8436077" cy="3426518"/>
+          </a:xfrm>
+        </p:spPr>
+        <p:txBody>
+          <a:bodyPr/>
+          <a:lstStyle/>
+          <a:p>
+            <a:r>
+              <a:rPr lang="en-US" dirty="0" smtClean="0"/>
+              <a:t>Implement Java code:</a:t>
+            </a:r>
+          </a:p>
+          <a:p>
+            <a:pPr lvl="1"/>
+            <a:r>
+              <a:rPr lang="en-US" dirty="0"/>
+              <a:t>\project\optional\</a:t>
+            </a:r>
+            <a:r>
+              <a:rPr lang="en-US" dirty="0" err="1"/>
+              <a:t>src</a:t>
+            </a:r>
+            <a:r>
+              <a:rPr lang="en-US" dirty="0"/>
+              <a:t>\main\java\com\</a:t>
+            </a:r>
+            <a:r>
+              <a:rPr lang="en-US" dirty="0" err="1"/>
+              <a:t>hadoop</a:t>
+            </a:r>
+            <a:r>
+              <a:rPr lang="en-US" dirty="0"/>
+              <a:t>\jobs </a:t>
+            </a:r>
+            <a:r>
+              <a:rPr lang="en-US" dirty="0" smtClean="0"/>
+              <a:t>CustomerDriver.java</a:t>
+            </a:r>
+            <a:endParaRPr lang="en-US" dirty="0" smtClean="0"/>
+          </a:p>
+          <a:p>
+            <a:pPr lvl="1"/>
+            <a:r>
+              <a:rPr lang="en-US" dirty="0"/>
+              <a:t>\</a:t>
+            </a:r>
+            <a:r>
+              <a:rPr lang="en-US" dirty="0" smtClean="0"/>
+              <a:t>project\optional\</a:t>
+            </a:r>
+            <a:r>
+              <a:rPr lang="en-US" dirty="0" err="1" smtClean="0"/>
+              <a:t>src</a:t>
+            </a:r>
+            <a:r>
+              <a:rPr lang="en-US" dirty="0" smtClean="0"/>
+              <a:t>\main\java\com\</a:t>
+            </a:r>
+            <a:r>
+              <a:rPr lang="en-US" dirty="0" err="1" smtClean="0"/>
+              <a:t>hadoop</a:t>
+            </a:r>
+            <a:r>
+              <a:rPr lang="en-US" dirty="0" smtClean="0"/>
+              <a:t>\mappers\</a:t>
+            </a:r>
+            <a:r>
+              <a:rPr lang="en-US" dirty="0"/>
+              <a:t>Customer</a:t>
+            </a:r>
+            <a:r>
+              <a:rPr lang="en-US" dirty="0" smtClean="0"/>
+              <a:t>Mapper.java</a:t>
+            </a:r>
+            <a:endParaRPr lang="en-US" dirty="0" smtClean="0"/>
+          </a:p>
+          <a:p>
+            <a:pPr lvl="1"/>
+            <a:r>
+              <a:rPr lang="en-US" dirty="0"/>
+              <a:t>\project\optional\</a:t>
+            </a:r>
+            <a:r>
+              <a:rPr lang="en-US" dirty="0" err="1"/>
+              <a:t>src</a:t>
+            </a:r>
+            <a:r>
+              <a:rPr lang="en-US" dirty="0"/>
+              <a:t>\main\java\com\</a:t>
+            </a:r>
+            <a:r>
+              <a:rPr lang="en-US" dirty="0" err="1"/>
+              <a:t>hadoop</a:t>
+            </a:r>
+            <a:r>
+              <a:rPr lang="en-US" dirty="0"/>
+              <a:t>\</a:t>
+            </a:r>
+            <a:r>
+              <a:rPr lang="en-US" dirty="0" smtClean="0"/>
+              <a:t>reducers\CustomerReducer.java</a:t>
+            </a:r>
+            <a:endParaRPr lang="en-US" dirty="0"/>
+          </a:p>
+          <a:p>
+            <a:pPr lvl="1"/>
+            <a:endParaRPr lang="en-US" dirty="0" smtClean="0"/>
+          </a:p>
+          <a:p>
+            <a:endParaRPr lang="en-US" dirty="0"/>
+          </a:p>
+        </p:txBody>
+      </p:sp>
+    </p:spTree>
+    <p:extLst>
+      <p:ext uri="{BB962C8B-B14F-4D97-AF65-F5344CB8AC3E}">
+        <p14:creationId xmlns:p14="http://schemas.microsoft.com/office/powerpoint/2010/main" val="716783205"/>
+      </p:ext>
+    </p:extLst>
+  </p:cSld>
+  <p:clrMapOvr>
+    <a:masterClrMapping/>
+  </p:clrMapOvr>
+  <p:timing>
+    <p:tnLst>
+      <p:par>
+        <p:cTn id="1" dur="indefinite" restart="never" nodeType="tmRoot"/>
+      </p:par>
+    </p:tnLst>
+  </p:timing>
+</p:sld>
+</file>
+
+<file path=ppt/slides/slide49.xml><?xml version="1.0" encoding="utf-8"?>
+<p:sld xmlns:a="http://schemas.openxmlformats.org/drawingml/2006/main" xmlns:r="http://schemas.openxmlformats.org/officeDocument/2006/relationships" xmlns:p="http://schemas.openxmlformats.org/presentationml/2006/main">
+  <p:cSld>
+    <p:spTree>
+      <p:nvGrpSpPr>
+        <p:cNvPr id="1" name=""/>
+        <p:cNvGrpSpPr/>
+        <p:nvPr/>
+      </p:nvGrpSpPr>
+      <p:grpSpPr>
+        <a:xfrm>
+          <a:off x="0" y="0"/>
+          <a:ext cx="0" cy="0"/>
+          <a:chOff x="0" y="0"/>
+          <a:chExt cx="0" cy="0"/>
+        </a:xfrm>
+      </p:grpSpPr>
+      <p:sp>
+        <p:nvSpPr>
+          <p:cNvPr id="2" name="Title 1"/>
+          <p:cNvSpPr>
+            <a:spLocks noGrp="1"/>
+          </p:cNvSpPr>
+          <p:nvPr>
+            <p:ph type="title"/>
+          </p:nvPr>
+        </p:nvSpPr>
+        <p:spPr/>
+        <p:txBody>
+          <a:bodyPr/>
+          <a:lstStyle/>
+          <a:p>
+            <a:r>
+              <a:rPr lang="en-US" dirty="0" smtClean="0"/>
+              <a:t>Input</a:t>
+            </a:r>
+            <a:endParaRPr lang="en-US" dirty="0"/>
+          </a:p>
+        </p:txBody>
+      </p:sp>
+      <p:sp>
+        <p:nvSpPr>
+          <p:cNvPr id="3" name="Content Placeholder 2"/>
+          <p:cNvSpPr>
+            <a:spLocks noGrp="1"/>
+          </p:cNvSpPr>
+          <p:nvPr>
+            <p:ph idx="1"/>
+          </p:nvPr>
+        </p:nvSpPr>
+        <p:spPr>
+          <a:xfrm>
+            <a:off x="457200" y="889083"/>
+            <a:ext cx="8229600" cy="694057"/>
+          </a:xfrm>
+        </p:spPr>
+        <p:txBody>
+          <a:bodyPr/>
+          <a:lstStyle/>
+          <a:p>
+            <a:r>
+              <a:rPr lang="en-US" dirty="0" smtClean="0"/>
+              <a:t>Input</a:t>
+            </a:r>
+            <a:r>
+              <a:rPr lang="en-US" dirty="0"/>
+              <a:t>: /</a:t>
+            </a:r>
+            <a:r>
+              <a:rPr lang="en-US" dirty="0" smtClean="0"/>
+              <a:t>project/input/</a:t>
+            </a:r>
+            <a:r>
+              <a:rPr lang="en-US" dirty="0" err="1" smtClean="0"/>
+              <a:t>customerinput</a:t>
+            </a:r>
+            <a:r>
+              <a:rPr lang="en-US" dirty="0" smtClean="0"/>
+              <a:t>*</a:t>
+            </a:r>
+            <a:endParaRPr lang="en-US" dirty="0" smtClean="0"/>
+          </a:p>
+          <a:p>
+            <a:endParaRPr lang="en-US" dirty="0" smtClean="0"/>
+          </a:p>
+          <a:p>
+            <a:endParaRPr lang="en-US" dirty="0" smtClean="0"/>
+          </a:p>
+          <a:p>
+            <a:endParaRPr lang="en-US" dirty="0" smtClean="0"/>
+          </a:p>
+          <a:p>
+            <a:endParaRPr lang="en-US" dirty="0"/>
+          </a:p>
+        </p:txBody>
+      </p:sp>
+      <p:pic>
+        <p:nvPicPr>
+          <p:cNvPr id="4" name="Picture 3"/>
+          <p:cNvPicPr>
+            <a:picLocks noChangeAspect="1"/>
+          </p:cNvPicPr>
+          <p:nvPr/>
+        </p:nvPicPr>
+        <p:blipFill rotWithShape="1">
+          <a:blip r:embed="rId2"/>
+          <a:srcRect b="14243"/>
+          <a:stretch/>
+        </p:blipFill>
+        <p:spPr>
+          <a:xfrm>
+            <a:off x="871964" y="1528845"/>
+            <a:ext cx="7271555" cy="2142403"/>
+          </a:xfrm>
+          <a:prstGeom prst="rect">
+            <a:avLst/>
+          </a:prstGeom>
+        </p:spPr>
+      </p:pic>
+      <p:pic>
+        <p:nvPicPr>
+          <p:cNvPr id="6" name="Picture 5"/>
+          <p:cNvPicPr>
+            <a:picLocks noChangeAspect="1"/>
+          </p:cNvPicPr>
+          <p:nvPr/>
+        </p:nvPicPr>
+        <p:blipFill rotWithShape="1">
+          <a:blip r:embed="rId3"/>
+          <a:srcRect b="20151"/>
+          <a:stretch/>
+        </p:blipFill>
+        <p:spPr>
+          <a:xfrm>
+            <a:off x="871964" y="4085940"/>
+            <a:ext cx="7400072" cy="2041905"/>
+          </a:xfrm>
+          <a:prstGeom prst="rect">
+            <a:avLst/>
+          </a:prstGeom>
+        </p:spPr>
+      </p:pic>
+    </p:spTree>
+    <p:extLst>
+      <p:ext uri="{BB962C8B-B14F-4D97-AF65-F5344CB8AC3E}">
+        <p14:creationId xmlns:p14="http://schemas.microsoft.com/office/powerpoint/2010/main" val="953601930"/>
+      </p:ext>
+    </p:extLst>
+  </p:cSld>
+  <p:clrMapOvr>
+    <a:masterClrMapping/>
+  </p:clrMapOvr>
+  <p:timing>
+    <p:tnLst>
+      <p:par>
+        <p:cTn id="1" dur="indefinite" restart="never" nodeType="tmRoot"/>
+      </p:par>
+    </p:tnLst>
+  </p:timing>
+</p:sld>
+</file>
+
+<file path=ppt/slides/slide5.xml><?xml version="1.0" encoding="utf-8"?>
+<p:sld xmlns:a="http://schemas.openxmlformats.org/drawingml/2006/main" xmlns:r="http://schemas.openxmlformats.org/officeDocument/2006/relationships" xmlns:p="http://schemas.openxmlformats.org/presentationml/2006/main">
+  <p:cSld>
+    <p:spTree>
+      <p:nvGrpSpPr>
+        <p:cNvPr id="1" name=""/>
+        <p:cNvGrpSpPr/>
+        <p:nvPr/>
+      </p:nvGrpSpPr>
+      <p:grpSpPr>
+        <a:xfrm>
+          <a:off x="0" y="0"/>
+          <a:ext cx="0" cy="0"/>
+          <a:chOff x="0" y="0"/>
+          <a:chExt cx="0" cy="0"/>
+        </a:xfrm>
+      </p:grpSpPr>
+      <p:sp>
+        <p:nvSpPr>
+          <p:cNvPr id="2" name="Title 1"/>
+          <p:cNvSpPr>
+            <a:spLocks noGrp="1"/>
+          </p:cNvSpPr>
+          <p:nvPr>
+            <p:ph type="title"/>
+          </p:nvPr>
+        </p:nvSpPr>
+        <p:spPr/>
+        <p:txBody>
+          <a:bodyPr/>
+          <a:lstStyle/>
+          <a:p>
+            <a:r>
+              <a:rPr lang="en-US" dirty="0" smtClean="0"/>
+              <a:t>SETUP STEPS</a:t>
+            </a:r>
+            <a:endParaRPr lang="en-US" dirty="0"/>
+          </a:p>
+        </p:txBody>
+      </p:sp>
+      <p:sp>
+        <p:nvSpPr>
+          <p:cNvPr id="3" name="Content Placeholder 2"/>
+          <p:cNvSpPr>
+            <a:spLocks noGrp="1"/>
+          </p:cNvSpPr>
+          <p:nvPr>
+            <p:ph idx="1"/>
+          </p:nvPr>
+        </p:nvSpPr>
+        <p:spPr>
+          <a:xfrm>
+            <a:off x="457208" y="1064532"/>
+            <a:ext cx="4198798" cy="4961755"/>
+          </a:xfrm>
+        </p:spPr>
+        <p:txBody>
+          <a:bodyPr/>
+          <a:lstStyle/>
+          <a:p>
+            <a:r>
+              <a:rPr lang="en-US" dirty="0" smtClean="0"/>
+              <a:t>Create Maven Project</a:t>
+            </a:r>
+          </a:p>
+          <a:p>
+            <a:r>
+              <a:rPr lang="en-US" dirty="0" smtClean="0"/>
+              <a:t>Add dependency (see pom.xml)</a:t>
+            </a:r>
+          </a:p>
+          <a:p>
+            <a:r>
+              <a:rPr lang="en-US" dirty="0" smtClean="0"/>
+              <a:t>Create package and project	structure like below</a:t>
+            </a:r>
+          </a:p>
+          <a:p>
+            <a:r>
+              <a:rPr lang="en-US" dirty="0"/>
+              <a:t>Create Mapper, Reducer, Driver classes</a:t>
+            </a:r>
+            <a:r>
+              <a:rPr lang="en-US" dirty="0" smtClean="0"/>
+              <a:t>.</a:t>
+            </a:r>
+          </a:p>
+          <a:p>
+            <a:endParaRPr lang="en-US" dirty="0" smtClean="0"/>
+          </a:p>
+          <a:p>
+            <a:pPr marL="0" indent="0">
+              <a:buNone/>
+            </a:pPr>
+            <a:endParaRPr lang="en-US" dirty="0" smtClean="0"/>
+          </a:p>
+          <a:p>
+            <a:pPr lvl="1"/>
+            <a:endParaRPr lang="en-US" dirty="0"/>
+          </a:p>
+        </p:txBody>
+      </p:sp>
+      <p:pic>
+        <p:nvPicPr>
+          <p:cNvPr id="5" name="Picture 4"/>
+          <p:cNvPicPr>
+            <a:picLocks noChangeAspect="1"/>
+          </p:cNvPicPr>
+          <p:nvPr/>
+        </p:nvPicPr>
+        <p:blipFill>
+          <a:blip r:embed="rId2"/>
+          <a:stretch>
+            <a:fillRect/>
+          </a:stretch>
+        </p:blipFill>
+        <p:spPr>
+          <a:xfrm>
+            <a:off x="4656005" y="739467"/>
+            <a:ext cx="4392809" cy="5101775"/>
+          </a:xfrm>
+          <a:prstGeom prst="rect">
+            <a:avLst/>
+          </a:prstGeom>
+        </p:spPr>
+      </p:pic>
+    </p:spTree>
+    <p:extLst>
+      <p:ext uri="{BB962C8B-B14F-4D97-AF65-F5344CB8AC3E}">
+        <p14:creationId xmlns:p14="http://schemas.microsoft.com/office/powerpoint/2010/main" val="2966593648"/>
+      </p:ext>
+    </p:extLst>
+  </p:cSld>
+  <p:clrMapOvr>
+    <a:masterClrMapping/>
+  </p:clrMapOvr>
+  <p:timing>
+    <p:tnLst>
+      <p:par>
+        <p:cTn id="1" dur="indefinite" restart="never" nodeType="tmRoot"/>
+      </p:par>
+    </p:tnLst>
+  </p:timing>
+</p:sld>
+</file>
+
+<file path=ppt/slides/slide50.xml><?xml version="1.0" encoding="utf-8"?>
+<p:sld xmlns:a="http://schemas.openxmlformats.org/drawingml/2006/main" xmlns:r="http://schemas.openxmlformats.org/officeDocument/2006/relationships" xmlns:p="http://schemas.openxmlformats.org/presentationml/2006/main">
+  <p:cSld>
+    <p:spTree>
+      <p:nvGrpSpPr>
+        <p:cNvPr id="1" name=""/>
+        <p:cNvGrpSpPr/>
+        <p:nvPr/>
+      </p:nvGrpSpPr>
+      <p:grpSpPr>
+        <a:xfrm>
+          <a:off x="0" y="0"/>
+          <a:ext cx="0" cy="0"/>
+          <a:chOff x="0" y="0"/>
+          <a:chExt cx="0" cy="0"/>
+        </a:xfrm>
+      </p:grpSpPr>
+      <p:sp>
+        <p:nvSpPr>
+          <p:cNvPr id="2" name="Title 1"/>
+          <p:cNvSpPr>
+            <a:spLocks noGrp="1"/>
+          </p:cNvSpPr>
+          <p:nvPr>
+            <p:ph type="title"/>
+          </p:nvPr>
+        </p:nvSpPr>
+        <p:spPr/>
+        <p:txBody>
+          <a:bodyPr/>
+          <a:lstStyle/>
+          <a:p>
+            <a:r>
+              <a:rPr lang="en-US" dirty="0" smtClean="0"/>
+              <a:t>Command line</a:t>
+            </a:r>
+            <a:endParaRPr lang="en-US" dirty="0"/>
+          </a:p>
+        </p:txBody>
+      </p:sp>
+      <p:sp>
+        <p:nvSpPr>
+          <p:cNvPr id="3" name="Content Placeholder 2"/>
+          <p:cNvSpPr>
+            <a:spLocks noGrp="1"/>
+          </p:cNvSpPr>
+          <p:nvPr>
+            <p:ph idx="1"/>
+          </p:nvPr>
+        </p:nvSpPr>
+        <p:spPr>
+          <a:xfrm>
+            <a:off x="457200" y="889083"/>
+            <a:ext cx="8229600" cy="694057"/>
+          </a:xfrm>
+        </p:spPr>
+        <p:txBody>
+          <a:bodyPr/>
+          <a:lstStyle/>
+          <a:p>
+            <a:r>
+              <a:rPr lang="en-US" dirty="0" smtClean="0"/>
+              <a:t>\bash\run_optional_job.sh</a:t>
+            </a:r>
+            <a:endParaRPr lang="en-US" dirty="0" smtClean="0"/>
+          </a:p>
+          <a:p>
+            <a:endParaRPr lang="en-US" dirty="0" smtClean="0"/>
+          </a:p>
+          <a:p>
+            <a:endParaRPr lang="en-US" dirty="0" smtClean="0"/>
+          </a:p>
+          <a:p>
+            <a:endParaRPr lang="en-US" dirty="0"/>
+          </a:p>
+        </p:txBody>
+      </p:sp>
+      <p:pic>
+        <p:nvPicPr>
+          <p:cNvPr id="7" name="Picture 6"/>
+          <p:cNvPicPr>
+            <a:picLocks noChangeAspect="1"/>
+          </p:cNvPicPr>
+          <p:nvPr/>
+        </p:nvPicPr>
+        <p:blipFill>
+          <a:blip r:embed="rId2"/>
+          <a:stretch>
+            <a:fillRect/>
+          </a:stretch>
+        </p:blipFill>
+        <p:spPr>
+          <a:xfrm>
+            <a:off x="644857" y="1760713"/>
+            <a:ext cx="7854286" cy="1255738"/>
+          </a:xfrm>
+          <a:prstGeom prst="rect">
+            <a:avLst/>
+          </a:prstGeom>
+        </p:spPr>
+      </p:pic>
+    </p:spTree>
+    <p:extLst>
+      <p:ext uri="{BB962C8B-B14F-4D97-AF65-F5344CB8AC3E}">
+        <p14:creationId xmlns:p14="http://schemas.microsoft.com/office/powerpoint/2010/main" val="979575510"/>
+      </p:ext>
+    </p:extLst>
+  </p:cSld>
+  <p:clrMapOvr>
+    <a:masterClrMapping/>
+  </p:clrMapOvr>
+  <p:timing>
+    <p:tnLst>
+      <p:par>
+        <p:cTn id="1" dur="indefinite" restart="never" nodeType="tmRoot"/>
+      </p:par>
+    </p:tnLst>
+  </p:timing>
+</p:sld>
+</file>
+
+<file path=ppt/slides/slide51.xml><?xml version="1.0" encoding="utf-8"?>
+<p:sld xmlns:a="http://schemas.openxmlformats.org/drawingml/2006/main" xmlns:r="http://schemas.openxmlformats.org/officeDocument/2006/relationships" xmlns:p="http://schemas.openxmlformats.org/presentationml/2006/main">
+  <p:cSld>
+    <p:spTree>
+      <p:nvGrpSpPr>
+        <p:cNvPr id="1" name=""/>
+        <p:cNvGrpSpPr/>
+        <p:nvPr/>
+      </p:nvGrpSpPr>
+      <p:grpSpPr>
+        <a:xfrm>
+          <a:off x="0" y="0"/>
+          <a:ext cx="0" cy="0"/>
+          <a:chOff x="0" y="0"/>
+          <a:chExt cx="0" cy="0"/>
+        </a:xfrm>
+      </p:grpSpPr>
+      <p:sp>
+        <p:nvSpPr>
+          <p:cNvPr id="2" name="Title 1"/>
+          <p:cNvSpPr>
+            <a:spLocks noGrp="1"/>
+          </p:cNvSpPr>
+          <p:nvPr>
+            <p:ph type="title"/>
+          </p:nvPr>
+        </p:nvSpPr>
+        <p:spPr/>
+        <p:txBody>
+          <a:bodyPr/>
+          <a:lstStyle/>
+          <a:p>
+            <a:r>
+              <a:rPr lang="en-US" dirty="0" smtClean="0"/>
+              <a:t>Terminal Output</a:t>
+            </a:r>
+            <a:endParaRPr lang="en-US" dirty="0"/>
+          </a:p>
+        </p:txBody>
+      </p:sp>
+      <p:pic>
+        <p:nvPicPr>
+          <p:cNvPr id="3" name="Picture 2"/>
+          <p:cNvPicPr>
+            <a:picLocks noChangeAspect="1"/>
+          </p:cNvPicPr>
+          <p:nvPr/>
+        </p:nvPicPr>
+        <p:blipFill rotWithShape="1">
+          <a:blip r:embed="rId2"/>
+          <a:srcRect t="252" b="670"/>
+          <a:stretch/>
+        </p:blipFill>
+        <p:spPr>
+          <a:xfrm>
+            <a:off x="868551" y="928048"/>
+            <a:ext cx="7688595" cy="5377218"/>
+          </a:xfrm>
+          <a:prstGeom prst="rect">
+            <a:avLst/>
+          </a:prstGeom>
+        </p:spPr>
+      </p:pic>
+    </p:spTree>
+    <p:extLst>
+      <p:ext uri="{BB962C8B-B14F-4D97-AF65-F5344CB8AC3E}">
+        <p14:creationId xmlns:p14="http://schemas.microsoft.com/office/powerpoint/2010/main" val="1238206560"/>
+      </p:ext>
+    </p:extLst>
+  </p:cSld>
+  <p:clrMapOvr>
+    <a:masterClrMapping/>
+  </p:clrMapOvr>
+  <p:timing>
+    <p:tnLst>
+      <p:par>
+        <p:cTn id="1" dur="indefinite" restart="never" nodeType="tmRoot"/>
+      </p:par>
+    </p:tnLst>
+  </p:timing>
+</p:sld>
+</file>
+
+<file path=ppt/slides/slide52.xml><?xml version="1.0" encoding="utf-8"?>
+<p:sld xmlns:a="http://schemas.openxmlformats.org/drawingml/2006/main" xmlns:r="http://schemas.openxmlformats.org/officeDocument/2006/relationships" xmlns:p="http://schemas.openxmlformats.org/presentationml/2006/main">
+  <p:cSld>
+    <p:spTree>
+      <p:nvGrpSpPr>
+        <p:cNvPr id="1" name=""/>
+        <p:cNvGrpSpPr/>
+        <p:nvPr/>
+      </p:nvGrpSpPr>
+      <p:grpSpPr>
+        <a:xfrm>
+          <a:off x="0" y="0"/>
+          <a:ext cx="0" cy="0"/>
+          <a:chOff x="0" y="0"/>
+          <a:chExt cx="0" cy="0"/>
+        </a:xfrm>
+      </p:grpSpPr>
       <p:pic>
         <p:nvPicPr>
           <p:cNvPr id="3076" name="Picture 4" descr="http://propertyinvestment.joburg/wp-content/uploads/2015/02/07.02.jpg"/>
@@ -13173,7 +15386,7 @@
 </p:sld>
 </file>
 
-<file path=ppt/slides/slide43.xml><?xml version="1.0" encoding="utf-8"?>
+<file path=ppt/slides/slide53.xml><?xml version="1.0" encoding="utf-8"?>
 <p:sld xmlns:a="http://schemas.openxmlformats.org/drawingml/2006/main" xmlns:r="http://schemas.openxmlformats.org/officeDocument/2006/relationships" xmlns:p="http://schemas.openxmlformats.org/presentationml/2006/main">
   <p:cSld>
     <p:spTree>
@@ -13213,8 +15426,8 @@
         </p:blipFill>
         <p:spPr bwMode="auto">
           <a:xfrm>
-            <a:off x="-130627" y="744513"/>
-            <a:ext cx="9522347" cy="5441340"/>
+            <a:off x="-40944" y="823612"/>
+            <a:ext cx="9383921" cy="5362240"/>
           </a:xfrm>
           <a:prstGeom prst="rect">
             <a:avLst/>
@@ -13241,152 +15454,6 @@
   <p:clrMapOvr>
     <a:masterClrMapping/>
   </p:clrMapOvr>
-</p:sld>
-</file>
-
-<file path=ppt/slides/slide5.xml><?xml version="1.0" encoding="utf-8"?>
-<p:sld xmlns:a="http://schemas.openxmlformats.org/drawingml/2006/main" xmlns:r="http://schemas.openxmlformats.org/officeDocument/2006/relationships" xmlns:p="http://schemas.openxmlformats.org/presentationml/2006/main">
-  <p:cSld>
-    <p:spTree>
-      <p:nvGrpSpPr>
-        <p:cNvPr id="1" name=""/>
-        <p:cNvGrpSpPr/>
-        <p:nvPr/>
-      </p:nvGrpSpPr>
-      <p:grpSpPr>
-        <a:xfrm>
-          <a:off x="0" y="0"/>
-          <a:ext cx="0" cy="0"/>
-          <a:chOff x="0" y="0"/>
-          <a:chExt cx="0" cy="0"/>
-        </a:xfrm>
-      </p:grpSpPr>
-      <p:sp>
-        <p:nvSpPr>
-          <p:cNvPr id="2" name="Title 1"/>
-          <p:cNvSpPr>
-            <a:spLocks noGrp="1"/>
-          </p:cNvSpPr>
-          <p:nvPr>
-            <p:ph type="title"/>
-          </p:nvPr>
-        </p:nvSpPr>
-        <p:spPr/>
-        <p:txBody>
-          <a:bodyPr/>
-          <a:lstStyle/>
-          <a:p>
-            <a:r>
-              <a:rPr lang="en-US" dirty="0" smtClean="0"/>
-              <a:t>SETUP STEPS</a:t>
-            </a:r>
-            <a:endParaRPr lang="en-US" dirty="0"/>
-          </a:p>
-        </p:txBody>
-      </p:sp>
-      <p:sp>
-        <p:nvSpPr>
-          <p:cNvPr id="3" name="Content Placeholder 2"/>
-          <p:cNvSpPr>
-            <a:spLocks noGrp="1"/>
-          </p:cNvSpPr>
-          <p:nvPr>
-            <p:ph idx="1"/>
-          </p:nvPr>
-        </p:nvSpPr>
-        <p:spPr>
-          <a:xfrm>
-            <a:off x="457208" y="1064532"/>
-            <a:ext cx="4198798" cy="4961755"/>
-          </a:xfrm>
-        </p:spPr>
-        <p:txBody>
-          <a:bodyPr/>
-          <a:lstStyle/>
-          <a:p>
-            <a:r>
-              <a:rPr lang="en-US" dirty="0" smtClean="0"/>
-              <a:t>Create Maven Project</a:t>
-            </a:r>
-          </a:p>
-          <a:p>
-            <a:r>
-              <a:rPr lang="en-US" dirty="0" smtClean="0"/>
-              <a:t>Add dependency (see pom.xml)</a:t>
-            </a:r>
-          </a:p>
-          <a:p>
-            <a:r>
-              <a:rPr lang="en-US" dirty="0" smtClean="0"/>
-              <a:t>Create package and project	structure like below</a:t>
-            </a:r>
-          </a:p>
-          <a:p>
-            <a:r>
-              <a:rPr lang="en-US" dirty="0"/>
-              <a:t>Create Mapper, Reducer, Driver classes</a:t>
-            </a:r>
-            <a:r>
-              <a:rPr lang="en-US" dirty="0" smtClean="0"/>
-              <a:t>.</a:t>
-            </a:r>
-          </a:p>
-          <a:p>
-            <a:endParaRPr lang="en-US" dirty="0" smtClean="0"/>
-          </a:p>
-          <a:p>
-            <a:pPr marL="0" indent="0">
-              <a:buNone/>
-            </a:pPr>
-            <a:endParaRPr lang="en-US" dirty="0" smtClean="0"/>
-          </a:p>
-          <a:p>
-            <a:pPr lvl="1"/>
-            <a:endParaRPr lang="en-US" dirty="0"/>
-          </a:p>
-        </p:txBody>
-      </p:sp>
-      <p:pic>
-        <p:nvPicPr>
-          <p:cNvPr id="5" name="Picture 4"/>
-          <p:cNvPicPr>
-            <a:picLocks noChangeAspect="1"/>
-          </p:cNvPicPr>
-          <p:nvPr/>
-        </p:nvPicPr>
-        <p:blipFill>
-          <a:blip r:embed="rId2"/>
-          <a:stretch>
-            <a:fillRect/>
-          </a:stretch>
-        </p:blipFill>
-        <p:spPr>
-          <a:xfrm>
-            <a:off x="4656005" y="739467"/>
-            <a:ext cx="4392809" cy="5101775"/>
-          </a:xfrm>
-          <a:prstGeom prst="rect">
-            <a:avLst/>
-          </a:prstGeom>
-        </p:spPr>
-      </p:pic>
-    </p:spTree>
-    <p:extLst>
-      <p:ext uri="{BB962C8B-B14F-4D97-AF65-F5344CB8AC3E}">
-        <p14:creationId xmlns:p14="http://schemas.microsoft.com/office/powerpoint/2010/main" val="2966593648"/>
-      </p:ext>
-    </p:extLst>
-  </p:cSld>
-  <p:clrMapOvr>
-    <a:masterClrMapping/>
-  </p:clrMapOvr>
-  <p:timing>
-    <p:tnLst>
-      <p:par>
-        <p:cTn id="1" dur="indefinite" restart="never" nodeType="tmRoot"/>
-      </p:par>
-    </p:tnLst>
-  </p:timing>
 </p:sld>
 </file>
 
@@ -13745,8 +15812,12 @@
           <a:p>
             <a:pPr lvl="1"/>
             <a:r>
+              <a:rPr lang="en-US" sz="2400" dirty="0" err="1" smtClean="0"/>
+              <a:t>cloudera</a:t>
+            </a:r>
+            <a:r>
               <a:rPr lang="en-US" sz="2400" dirty="0" smtClean="0"/>
-              <a:t>...</a:t>
+              <a:t>\bash\run_optional_job.sh: run part 9.</a:t>
             </a:r>
             <a:endParaRPr lang="en-US" sz="2400" dirty="0"/>
           </a:p>

</xml_diff>